<commit_message>
Update class diagram in the .pptx
</commit_message>
<xml_diff>
--- a/Documentation/SpaceShooter.pptx
+++ b/Documentation/SpaceShooter.pptx
@@ -12,7 +12,7 @@
     <p:sldId id="257" r:id="rId3"/>
     <p:sldId id="258" r:id="rId4"/>
     <p:sldId id="259" r:id="rId5"/>
-    <p:sldId id="260" r:id="rId6"/>
+    <p:sldId id="268" r:id="rId6"/>
     <p:sldId id="261" r:id="rId7"/>
     <p:sldId id="262" r:id="rId8"/>
     <p:sldId id="263" r:id="rId9"/>
@@ -7135,32 +7135,21 @@
             <p:ph type="title"/>
           </p:nvPr>
         </p:nvSpPr>
-        <p:spPr/>
+        <p:spPr>
+          <a:xfrm>
+            <a:off x="0" y="0"/>
+            <a:ext cx="10131425" cy="1456267"/>
+          </a:xfrm>
+        </p:spPr>
         <p:txBody>
           <a:bodyPr/>
           <a:lstStyle/>
           <a:p>
-            <a:pPr marL="0" marR="0" indent="0" algn="l" defTabSz="457200" rtl="0" eaLnBrk="1" fontAlgn="auto" latinLnBrk="0" hangingPunct="1">
-              <a:lnSpc>
-                <a:spcPct val="100000"/>
-              </a:lnSpc>
-              <a:spcBef>
-                <a:spcPct val="0"/>
-              </a:spcBef>
-              <a:spcAft>
-                <a:spcPts val="0"/>
-              </a:spcAft>
-              <a:buClrTx/>
-              <a:buSzTx/>
-              <a:buFontTx/>
-              <a:buNone/>
-              <a:tabLst/>
-              <a:defRPr/>
-            </a:pPr>
-            <a:r>
-              <a:rPr lang="fi-FI" b="1" dirty="0" smtClean="0"/>
-              <a:t>Rakennekaavio</a:t>
-            </a:r>
+            <a:r>
+              <a:rPr lang="fi-FI" dirty="0" smtClean="0"/>
+              <a:t>luokkakaavio</a:t>
+            </a:r>
+            <a:endParaRPr lang="fi-FI" dirty="0"/>
           </a:p>
         </p:txBody>
       </p:sp>
@@ -7171,109 +7160,38 @@
             <a:picLocks noGrp="1" noChangeAspect="1"/>
           </p:cNvPicPr>
           <p:nvPr>
-            <p:ph type="pic" idx="1"/>
+            <p:ph idx="1"/>
           </p:nvPr>
         </p:nvPicPr>
         <p:blipFill>
-          <a:blip r:embed="rId2"/>
-          <a:srcRect l="7080" r="7080"/>
+          <a:blip r:embed="rId2">
+            <a:extLst>
+              <a:ext uri="{28A0092B-C50C-407E-A947-70E740481C1C}">
+                <a14:useLocalDpi xmlns:a14="http://schemas.microsoft.com/office/drawing/2010/main" val="0"/>
+              </a:ext>
+            </a:extLst>
+          </a:blip>
           <a:stretch>
             <a:fillRect/>
           </a:stretch>
         </p:blipFill>
         <p:spPr>
           <a:xfrm>
-            <a:off x="6850453" y="-41255"/>
-            <a:ext cx="5080290" cy="7079327"/>
+            <a:off x="3702543" y="180623"/>
+            <a:ext cx="5326341" cy="6513689"/>
           </a:xfrm>
-          <a:prstGeom prst="rect">
-            <a:avLst/>
-          </a:prstGeom>
         </p:spPr>
       </p:pic>
-      <p:sp>
-        <p:nvSpPr>
-          <p:cNvPr id="5" name="Tekstin paikkamerkki 4"/>
-          <p:cNvSpPr>
-            <a:spLocks noGrp="1"/>
-          </p:cNvSpPr>
-          <p:nvPr>
-            <p:ph type="body" sz="half" idx="2"/>
-          </p:nvPr>
-        </p:nvSpPr>
-        <p:spPr>
-          <a:xfrm>
-            <a:off x="566058" y="2971800"/>
-            <a:ext cx="6284396" cy="2108200"/>
-          </a:xfrm>
-        </p:spPr>
-        <p:txBody>
-          <a:bodyPr>
-            <a:normAutofit lnSpcReduction="10000"/>
-          </a:bodyPr>
-          <a:lstStyle/>
-          <a:p>
-            <a:pPr marL="0" indent="0">
-              <a:buNone/>
-            </a:pPr>
-            <a:r>
-              <a:rPr lang="fi-FI" sz="2000" b="1" dirty="0" err="1" smtClean="0"/>
-              <a:t>SpaceShooterGame</a:t>
-            </a:r>
-            <a:endParaRPr lang="fi-FI" sz="2000" b="1" dirty="0" smtClean="0"/>
-          </a:p>
-          <a:p>
-            <a:r>
-              <a:rPr lang="fi-FI" sz="2000" dirty="0" smtClean="0"/>
-              <a:t>Pelin pääluokka, joka sisältää (käyttöliittymää </a:t>
-            </a:r>
-            <a:r>
-              <a:rPr lang="fi-FI" sz="2000" dirty="0" err="1" smtClean="0"/>
-              <a:t>lukuunottamatta</a:t>
-            </a:r>
-            <a:r>
-              <a:rPr lang="fi-FI" sz="2000" dirty="0" smtClean="0"/>
-              <a:t>) kaiken peliin kuuluvan sisällään. Se luodaan kerran ohjelman suorituksen alussa ja sitä käytetään sen loppuun asti. Periytyy </a:t>
-            </a:r>
-            <a:r>
-              <a:rPr lang="fi-FI" sz="2000" dirty="0" err="1" smtClean="0"/>
-              <a:t>MonoGamen</a:t>
-            </a:r>
-            <a:r>
-              <a:rPr lang="fi-FI" sz="2000" dirty="0" smtClean="0"/>
-              <a:t> </a:t>
-            </a:r>
-            <a:r>
-              <a:rPr lang="fi-FI" sz="2000" dirty="0" err="1" smtClean="0"/>
-              <a:t>Game</a:t>
-            </a:r>
-            <a:r>
-              <a:rPr lang="fi-FI" sz="2000" dirty="0" smtClean="0"/>
-              <a:t>-luokasta.</a:t>
-            </a:r>
-          </a:p>
-          <a:p>
-            <a:endParaRPr lang="fi-FI" dirty="0"/>
-          </a:p>
-        </p:txBody>
-      </p:sp>
     </p:spTree>
     <p:extLst>
       <p:ext uri="{BB962C8B-B14F-4D97-AF65-F5344CB8AC3E}">
-        <p14:creationId xmlns:p14="http://schemas.microsoft.com/office/powerpoint/2010/main" val="1977376843"/>
+        <p14:creationId xmlns:p14="http://schemas.microsoft.com/office/powerpoint/2010/main" val="1092081302"/>
       </p:ext>
     </p:extLst>
   </p:cSld>
   <p:clrMapOvr>
     <a:masterClrMapping/>
   </p:clrMapOvr>
-  <p:timing>
-    <p:tnLst>
-      <p:par>
-        <p:cTn id="1" dur="indefinite" restart="never" nodeType="tmRoot"/>
-      </p:par>
-    </p:tnLst>
-  </p:timing>
 </p:sld>
 </file>
 

</xml_diff>

<commit_message>
Move UML to the end of the .pptx
</commit_message>
<xml_diff>
--- a/Documentation/SpaceShooter.pptx
+++ b/Documentation/SpaceShooter.pptx
@@ -12,14 +12,14 @@
     <p:sldId id="257" r:id="rId3"/>
     <p:sldId id="258" r:id="rId4"/>
     <p:sldId id="259" r:id="rId5"/>
-    <p:sldId id="268" r:id="rId6"/>
-    <p:sldId id="261" r:id="rId7"/>
-    <p:sldId id="262" r:id="rId8"/>
-    <p:sldId id="263" r:id="rId9"/>
-    <p:sldId id="264" r:id="rId10"/>
-    <p:sldId id="265" r:id="rId11"/>
-    <p:sldId id="266" r:id="rId12"/>
-    <p:sldId id="267" r:id="rId13"/>
+    <p:sldId id="261" r:id="rId6"/>
+    <p:sldId id="262" r:id="rId7"/>
+    <p:sldId id="263" r:id="rId8"/>
+    <p:sldId id="264" r:id="rId9"/>
+    <p:sldId id="265" r:id="rId10"/>
+    <p:sldId id="266" r:id="rId11"/>
+    <p:sldId id="267" r:id="rId12"/>
+    <p:sldId id="268" r:id="rId13"/>
   </p:sldIdLst>
   <p:sldSz cx="12192000" cy="6858000"/>
   <p:notesSz cx="6858000" cy="9144000"/>
@@ -6349,97 +6349,6 @@
             <p:ph type="title"/>
           </p:nvPr>
         </p:nvSpPr>
-        <p:spPr/>
-        <p:txBody>
-          <a:bodyPr>
-            <a:normAutofit/>
-          </a:bodyPr>
-          <a:lstStyle/>
-          <a:p>
-            <a:r>
-              <a:rPr lang="fi-FI" dirty="0" smtClean="0"/>
-              <a:t>Inventory/ Shop</a:t>
-            </a:r>
-            <a:endParaRPr lang="fi-FI" dirty="0"/>
-          </a:p>
-        </p:txBody>
-      </p:sp>
-      <p:pic>
-        <p:nvPicPr>
-          <p:cNvPr id="5" name="Kuvan paikkamerkki 4"/>
-          <p:cNvPicPr>
-            <a:picLocks noGrp="1" noChangeAspect="1"/>
-          </p:cNvPicPr>
-          <p:nvPr>
-            <p:ph idx="1"/>
-          </p:nvPr>
-        </p:nvPicPr>
-        <p:blipFill>
-          <a:blip r:embed="rId2">
-            <a:extLst>
-              <a:ext uri="{28A0092B-C50C-407E-A947-70E740481C1C}">
-                <a14:useLocalDpi xmlns:a14="http://schemas.microsoft.com/office/drawing/2010/main" val="0"/>
-              </a:ext>
-            </a:extLst>
-          </a:blip>
-          <a:stretch>
-            <a:fillRect/>
-          </a:stretch>
-        </p:blipFill>
-        <p:spPr>
-          <a:xfrm>
-            <a:off x="1771651" y="1644451"/>
-            <a:ext cx="8667750" cy="5056909"/>
-          </a:xfrm>
-        </p:spPr>
-      </p:pic>
-    </p:spTree>
-    <p:extLst>
-      <p:ext uri="{BB962C8B-B14F-4D97-AF65-F5344CB8AC3E}">
-        <p14:creationId xmlns:p14="http://schemas.microsoft.com/office/powerpoint/2010/main" val="2136605178"/>
-      </p:ext>
-    </p:extLst>
-  </p:cSld>
-  <p:clrMapOvr>
-    <a:masterClrMapping/>
-  </p:clrMapOvr>
-  <p:timing>
-    <p:tnLst>
-      <p:par>
-        <p:cTn id="1" dur="indefinite" restart="never" nodeType="tmRoot"/>
-      </p:par>
-    </p:tnLst>
-  </p:timing>
-</p:sld>
-</file>
-
-<file path=ppt/slides/slide11.xml><?xml version="1.0" encoding="utf-8"?>
-<p:sld xmlns:a="http://schemas.openxmlformats.org/drawingml/2006/main" xmlns:r="http://schemas.openxmlformats.org/officeDocument/2006/relationships" xmlns:p="http://schemas.openxmlformats.org/presentationml/2006/main">
-  <p:cSld>
-    <p:spTree>
-      <p:nvGrpSpPr>
-        <p:cNvPr id="1" name=""/>
-        <p:cNvGrpSpPr/>
-        <p:nvPr/>
-      </p:nvGrpSpPr>
-      <p:grpSpPr>
-        <a:xfrm>
-          <a:off x="0" y="0"/>
-          <a:ext cx="0" cy="0"/>
-          <a:chOff x="0" y="0"/>
-          <a:chExt cx="0" cy="0"/>
-        </a:xfrm>
-      </p:grpSpPr>
-      <p:sp>
-        <p:nvSpPr>
-          <p:cNvPr id="2" name="Otsikko 1"/>
-          <p:cNvSpPr>
-            <a:spLocks noGrp="1"/>
-          </p:cNvSpPr>
-          <p:nvPr>
-            <p:ph type="title"/>
-          </p:nvPr>
-        </p:nvSpPr>
         <p:spPr>
           <a:xfrm>
             <a:off x="1096961" y="207084"/>
@@ -6507,7 +6416,7 @@
 </p:sld>
 </file>
 
-<file path=ppt/slides/slide12.xml><?xml version="1.0" encoding="utf-8"?>
+<file path=ppt/slides/slide11.xml><?xml version="1.0" encoding="utf-8"?>
 <p:sld xmlns:a="http://schemas.openxmlformats.org/drawingml/2006/main" xmlns:r="http://schemas.openxmlformats.org/officeDocument/2006/relationships" xmlns:p="http://schemas.openxmlformats.org/presentationml/2006/main">
   <p:cSld>
     <p:spTree>
@@ -6601,6 +6510,93 @@
 </p:sld>
 </file>
 
+<file path=ppt/slides/slide12.xml><?xml version="1.0" encoding="utf-8"?>
+<p:sld xmlns:a="http://schemas.openxmlformats.org/drawingml/2006/main" xmlns:r="http://schemas.openxmlformats.org/officeDocument/2006/relationships" xmlns:p="http://schemas.openxmlformats.org/presentationml/2006/main">
+  <p:cSld>
+    <p:spTree>
+      <p:nvGrpSpPr>
+        <p:cNvPr id="1" name=""/>
+        <p:cNvGrpSpPr/>
+        <p:nvPr/>
+      </p:nvGrpSpPr>
+      <p:grpSpPr>
+        <a:xfrm>
+          <a:off x="0" y="0"/>
+          <a:ext cx="0" cy="0"/>
+          <a:chOff x="0" y="0"/>
+          <a:chExt cx="0" cy="0"/>
+        </a:xfrm>
+      </p:grpSpPr>
+      <p:sp>
+        <p:nvSpPr>
+          <p:cNvPr id="2" name="Otsikko 1"/>
+          <p:cNvSpPr>
+            <a:spLocks noGrp="1"/>
+          </p:cNvSpPr>
+          <p:nvPr>
+            <p:ph type="title"/>
+          </p:nvPr>
+        </p:nvSpPr>
+        <p:spPr>
+          <a:xfrm>
+            <a:off x="0" y="0"/>
+            <a:ext cx="10131425" cy="1456267"/>
+          </a:xfrm>
+        </p:spPr>
+        <p:txBody>
+          <a:bodyPr/>
+          <a:lstStyle/>
+          <a:p>
+            <a:r>
+              <a:rPr lang="fi-FI" dirty="0" smtClean="0"/>
+              <a:t>luokkakaavio</a:t>
+            </a:r>
+            <a:endParaRPr lang="fi-FI" dirty="0"/>
+          </a:p>
+        </p:txBody>
+      </p:sp>
+      <p:pic>
+        <p:nvPicPr>
+          <p:cNvPr id="4" name="Sisällön paikkamerkki 3"/>
+          <p:cNvPicPr>
+            <a:picLocks noGrp="1" noChangeAspect="1"/>
+          </p:cNvPicPr>
+          <p:nvPr>
+            <p:ph idx="1"/>
+          </p:nvPr>
+        </p:nvPicPr>
+        <p:blipFill>
+          <a:blip r:embed="rId2">
+            <a:extLst>
+              <a:ext uri="{28A0092B-C50C-407E-A947-70E740481C1C}">
+                <a14:useLocalDpi xmlns:a14="http://schemas.microsoft.com/office/drawing/2010/main" val="0"/>
+              </a:ext>
+            </a:extLst>
+          </a:blip>
+          <a:stretch>
+            <a:fillRect/>
+          </a:stretch>
+        </p:blipFill>
+        <p:spPr>
+          <a:xfrm>
+            <a:off x="3702543" y="180623"/>
+            <a:ext cx="5326341" cy="6513689"/>
+          </a:xfrm>
+        </p:spPr>
+      </p:pic>
+    </p:spTree>
+    <p:extLst>
+      <p:ext uri="{BB962C8B-B14F-4D97-AF65-F5344CB8AC3E}">
+        <p14:creationId xmlns:p14="http://schemas.microsoft.com/office/powerpoint/2010/main" val="1092081302"/>
+      </p:ext>
+    </p:extLst>
+  </p:cSld>
+  <p:clrMapOvr>
+    <a:masterClrMapping/>
+  </p:clrMapOvr>
+</p:sld>
+</file>
+
 <file path=ppt/slides/slide2.xml><?xml version="1.0" encoding="utf-8"?>
 <p:sld xmlns:a="http://schemas.openxmlformats.org/drawingml/2006/main" xmlns:r="http://schemas.openxmlformats.org/officeDocument/2006/relationships" xmlns:p="http://schemas.openxmlformats.org/presentationml/2006/main">
   <p:cSld>
@@ -7137,93 +7133,6 @@
         </p:nvSpPr>
         <p:spPr>
           <a:xfrm>
-            <a:off x="0" y="0"/>
-            <a:ext cx="10131425" cy="1456267"/>
-          </a:xfrm>
-        </p:spPr>
-        <p:txBody>
-          <a:bodyPr/>
-          <a:lstStyle/>
-          <a:p>
-            <a:r>
-              <a:rPr lang="fi-FI" dirty="0" smtClean="0"/>
-              <a:t>luokkakaavio</a:t>
-            </a:r>
-            <a:endParaRPr lang="fi-FI" dirty="0"/>
-          </a:p>
-        </p:txBody>
-      </p:sp>
-      <p:pic>
-        <p:nvPicPr>
-          <p:cNvPr id="4" name="Sisällön paikkamerkki 3"/>
-          <p:cNvPicPr>
-            <a:picLocks noGrp="1" noChangeAspect="1"/>
-          </p:cNvPicPr>
-          <p:nvPr>
-            <p:ph idx="1"/>
-          </p:nvPr>
-        </p:nvPicPr>
-        <p:blipFill>
-          <a:blip r:embed="rId2">
-            <a:extLst>
-              <a:ext uri="{28A0092B-C50C-407E-A947-70E740481C1C}">
-                <a14:useLocalDpi xmlns:a14="http://schemas.microsoft.com/office/drawing/2010/main" val="0"/>
-              </a:ext>
-            </a:extLst>
-          </a:blip>
-          <a:stretch>
-            <a:fillRect/>
-          </a:stretch>
-        </p:blipFill>
-        <p:spPr>
-          <a:xfrm>
-            <a:off x="3702543" y="180623"/>
-            <a:ext cx="5326341" cy="6513689"/>
-          </a:xfrm>
-        </p:spPr>
-      </p:pic>
-    </p:spTree>
-    <p:extLst>
-      <p:ext uri="{BB962C8B-B14F-4D97-AF65-F5344CB8AC3E}">
-        <p14:creationId xmlns:p14="http://schemas.microsoft.com/office/powerpoint/2010/main" val="1092081302"/>
-      </p:ext>
-    </p:extLst>
-  </p:cSld>
-  <p:clrMapOvr>
-    <a:masterClrMapping/>
-  </p:clrMapOvr>
-</p:sld>
-</file>
-
-<file path=ppt/slides/slide6.xml><?xml version="1.0" encoding="utf-8"?>
-<p:sld xmlns:a="http://schemas.openxmlformats.org/drawingml/2006/main" xmlns:r="http://schemas.openxmlformats.org/officeDocument/2006/relationships" xmlns:p="http://schemas.openxmlformats.org/presentationml/2006/main">
-  <p:cSld>
-    <p:spTree>
-      <p:nvGrpSpPr>
-        <p:cNvPr id="1" name=""/>
-        <p:cNvGrpSpPr/>
-        <p:nvPr/>
-      </p:nvGrpSpPr>
-      <p:grpSpPr>
-        <a:xfrm>
-          <a:off x="0" y="0"/>
-          <a:ext cx="0" cy="0"/>
-          <a:chOff x="0" y="0"/>
-          <a:chExt cx="0" cy="0"/>
-        </a:xfrm>
-      </p:grpSpPr>
-      <p:sp>
-        <p:nvSpPr>
-          <p:cNvPr id="2" name="Otsikko 1"/>
-          <p:cNvSpPr>
-            <a:spLocks noGrp="1"/>
-          </p:cNvSpPr>
-          <p:nvPr>
-            <p:ph type="title"/>
-          </p:nvPr>
-        </p:nvSpPr>
-        <p:spPr>
-          <a:xfrm>
             <a:off x="32947" y="0"/>
             <a:ext cx="6164653" cy="1371600"/>
           </a:xfrm>
@@ -7425,7 +7334,7 @@
 </p:sld>
 </file>
 
-<file path=ppt/slides/slide7.xml><?xml version="1.0" encoding="utf-8"?>
+<file path=ppt/slides/slide6.xml><?xml version="1.0" encoding="utf-8"?>
 <p:sld xmlns:a="http://schemas.openxmlformats.org/drawingml/2006/main" xmlns:r="http://schemas.openxmlformats.org/officeDocument/2006/relationships" xmlns:p="http://schemas.openxmlformats.org/presentationml/2006/main">
   <p:cSld>
     <p:spTree>
@@ -7518,7 +7427,7 @@
 </p:sld>
 </file>
 
-<file path=ppt/slides/slide8.xml><?xml version="1.0" encoding="utf-8"?>
+<file path=ppt/slides/slide7.xml><?xml version="1.0" encoding="utf-8"?>
 <p:sld xmlns:a="http://schemas.openxmlformats.org/drawingml/2006/main" xmlns:r="http://schemas.openxmlformats.org/officeDocument/2006/relationships" xmlns:p="http://schemas.openxmlformats.org/presentationml/2006/main">
   <p:cSld>
     <p:spTree>
@@ -7616,7 +7525,7 @@
 </p:sld>
 </file>
 
-<file path=ppt/slides/slide9.xml><?xml version="1.0" encoding="utf-8"?>
+<file path=ppt/slides/slide8.xml><?xml version="1.0" encoding="utf-8"?>
 <p:sld xmlns:a="http://schemas.openxmlformats.org/drawingml/2006/main" xmlns:r="http://schemas.openxmlformats.org/officeDocument/2006/relationships" xmlns:p="http://schemas.openxmlformats.org/presentationml/2006/main">
   <p:cSld>
     <p:spTree>
@@ -7690,6 +7599,97 @@
     <p:extLst>
       <p:ext uri="{BB962C8B-B14F-4D97-AF65-F5344CB8AC3E}">
         <p14:creationId xmlns:p14="http://schemas.microsoft.com/office/powerpoint/2010/main" val="3174048705"/>
+      </p:ext>
+    </p:extLst>
+  </p:cSld>
+  <p:clrMapOvr>
+    <a:masterClrMapping/>
+  </p:clrMapOvr>
+  <p:timing>
+    <p:tnLst>
+      <p:par>
+        <p:cTn id="1" dur="indefinite" restart="never" nodeType="tmRoot"/>
+      </p:par>
+    </p:tnLst>
+  </p:timing>
+</p:sld>
+</file>
+
+<file path=ppt/slides/slide9.xml><?xml version="1.0" encoding="utf-8"?>
+<p:sld xmlns:a="http://schemas.openxmlformats.org/drawingml/2006/main" xmlns:r="http://schemas.openxmlformats.org/officeDocument/2006/relationships" xmlns:p="http://schemas.openxmlformats.org/presentationml/2006/main">
+  <p:cSld>
+    <p:spTree>
+      <p:nvGrpSpPr>
+        <p:cNvPr id="1" name=""/>
+        <p:cNvGrpSpPr/>
+        <p:nvPr/>
+      </p:nvGrpSpPr>
+      <p:grpSpPr>
+        <a:xfrm>
+          <a:off x="0" y="0"/>
+          <a:ext cx="0" cy="0"/>
+          <a:chOff x="0" y="0"/>
+          <a:chExt cx="0" cy="0"/>
+        </a:xfrm>
+      </p:grpSpPr>
+      <p:sp>
+        <p:nvSpPr>
+          <p:cNvPr id="2" name="Otsikko 1"/>
+          <p:cNvSpPr>
+            <a:spLocks noGrp="1"/>
+          </p:cNvSpPr>
+          <p:nvPr>
+            <p:ph type="title"/>
+          </p:nvPr>
+        </p:nvSpPr>
+        <p:spPr/>
+        <p:txBody>
+          <a:bodyPr>
+            <a:normAutofit/>
+          </a:bodyPr>
+          <a:lstStyle/>
+          <a:p>
+            <a:r>
+              <a:rPr lang="fi-FI" dirty="0" smtClean="0"/>
+              <a:t>Inventory/ Shop</a:t>
+            </a:r>
+            <a:endParaRPr lang="fi-FI" dirty="0"/>
+          </a:p>
+        </p:txBody>
+      </p:sp>
+      <p:pic>
+        <p:nvPicPr>
+          <p:cNvPr id="5" name="Kuvan paikkamerkki 4"/>
+          <p:cNvPicPr>
+            <a:picLocks noGrp="1" noChangeAspect="1"/>
+          </p:cNvPicPr>
+          <p:nvPr>
+            <p:ph idx="1"/>
+          </p:nvPr>
+        </p:nvPicPr>
+        <p:blipFill>
+          <a:blip r:embed="rId2">
+            <a:extLst>
+              <a:ext uri="{28A0092B-C50C-407E-A947-70E740481C1C}">
+                <a14:useLocalDpi xmlns:a14="http://schemas.microsoft.com/office/drawing/2010/main" val="0"/>
+              </a:ext>
+            </a:extLst>
+          </a:blip>
+          <a:stretch>
+            <a:fillRect/>
+          </a:stretch>
+        </p:blipFill>
+        <p:spPr>
+          <a:xfrm>
+            <a:off x="1771651" y="1644451"/>
+            <a:ext cx="8667750" cy="5056909"/>
+          </a:xfrm>
+        </p:spPr>
+      </p:pic>
+    </p:spTree>
+    <p:extLst>
+      <p:ext uri="{BB962C8B-B14F-4D97-AF65-F5344CB8AC3E}">
+        <p14:creationId xmlns:p14="http://schemas.microsoft.com/office/powerpoint/2010/main" val="2136605178"/>
       </p:ext>
     </p:extLst>
   </p:cSld>

</xml_diff>